<commit_message>
Finish base shape of framework without tuner
</commit_message>
<xml_diff>
--- a/Bachelor thesis.pptx
+++ b/Bachelor thesis.pptx
@@ -5326,12 +5326,41 @@
               <a:buAutoNum type="arabicPeriod"/>
             </a:pPr>
             <a:r>
+              <a:rPr lang="pl-PL" dirty="0">
+                <a:solidFill>
+                  <a:schemeClr val="accent3"/>
+                </a:solidFill>
+              </a:rPr>
+              <a:t>Best Model </a:t>
+            </a:r>
+            <a:r>
               <a:rPr lang="pl-PL" dirty="0" err="1">
                 <a:solidFill>
                   <a:schemeClr val="accent3"/>
                 </a:solidFill>
               </a:rPr>
-              <a:t>Implement</a:t>
+              <a:t>strategy</a:t>
+            </a:r>
+            <a:r>
+              <a:rPr lang="pl-PL" dirty="0">
+                <a:solidFill>
+                  <a:schemeClr val="accent3"/>
+                </a:solidFill>
+              </a:rPr>
+              <a:t> [27.01.2024]</a:t>
+            </a:r>
+          </a:p>
+          <a:p>
+            <a:pPr marL="457200" indent="-457200">
+              <a:buAutoNum type="arabicPeriod"/>
+            </a:pPr>
+            <a:r>
+              <a:rPr lang="pl-PL" dirty="0" err="1">
+                <a:solidFill>
+                  <a:schemeClr val="accent3"/>
+                </a:solidFill>
+              </a:rPr>
+              <a:t>Aggregation</a:t>
             </a:r>
             <a:r>
               <a:rPr lang="pl-PL" dirty="0">
@@ -5347,7 +5376,7 @@
                   <a:schemeClr val="accent3"/>
                 </a:solidFill>
               </a:rPr>
-              <a:t>Multiplexing</a:t>
+              <a:t>strategy</a:t>
             </a:r>
             <a:r>
               <a:rPr lang="pl-PL" dirty="0">
@@ -5356,15 +5385,6 @@
                 </a:solidFill>
               </a:rPr>
               <a:t> [27.01.2024]</a:t>
-            </a:r>
-          </a:p>
-          <a:p>
-            <a:pPr marL="457200" indent="-457200">
-              <a:buAutoNum type="arabicPeriod"/>
-            </a:pPr>
-            <a:r>
-              <a:rPr lang="pl-PL" dirty="0"/>
-              <a:t>Data postprocesor [27.01.2024]</a:t>
             </a:r>
           </a:p>
         </p:txBody>
@@ -5453,15 +5473,27 @@
               <a:buChar char="•"/>
             </a:pPr>
             <a:r>
-              <a:rPr lang="pl-PL" dirty="0"/>
+              <a:rPr lang="pl-PL" dirty="0">
+                <a:solidFill>
+                  <a:schemeClr val="accent3"/>
+                </a:solidFill>
+              </a:rPr>
               <a:t>Data </a:t>
             </a:r>
             <a:r>
-              <a:rPr lang="pl-PL" dirty="0" err="1"/>
+              <a:rPr lang="pl-PL" dirty="0" err="1">
+                <a:solidFill>
+                  <a:schemeClr val="accent3"/>
+                </a:solidFill>
+              </a:rPr>
               <a:t>Evaluator</a:t>
             </a:r>
             <a:r>
-              <a:rPr lang="pl-PL" dirty="0"/>
+              <a:rPr lang="pl-PL" dirty="0">
+                <a:solidFill>
+                  <a:schemeClr val="accent3"/>
+                </a:solidFill>
+              </a:rPr>
               <a:t> [28.01.2024]</a:t>
             </a:r>
           </a:p>
@@ -5471,15 +5503,27 @@
               <a:buChar char="•"/>
             </a:pPr>
             <a:r>
-              <a:rPr lang="pl-PL" dirty="0"/>
+              <a:rPr lang="pl-PL" dirty="0">
+                <a:solidFill>
+                  <a:schemeClr val="accent3"/>
+                </a:solidFill>
+              </a:rPr>
               <a:t>Time </a:t>
             </a:r>
             <a:r>
-              <a:rPr lang="pl-PL" dirty="0" err="1"/>
+              <a:rPr lang="pl-PL" dirty="0" err="1">
+                <a:solidFill>
+                  <a:schemeClr val="accent3"/>
+                </a:solidFill>
+              </a:rPr>
               <a:t>Evaluator</a:t>
             </a:r>
             <a:r>
-              <a:rPr lang="pl-PL" dirty="0"/>
+              <a:rPr lang="pl-PL" dirty="0">
+                <a:solidFill>
+                  <a:schemeClr val="accent3"/>
+                </a:solidFill>
+              </a:rPr>
               <a:t> [28.01.2024]</a:t>
             </a:r>
           </a:p>

</xml_diff>